<commit_message>
Changed 'countries' to 'countries/regions in the area'
</commit_message>
<xml_diff>
--- a/WDS/Whiteboard design session trainer presentation - Azure Stack.pptx
+++ b/WDS/Whiteboard design session trainer presentation - Azure Stack.pptx
@@ -182,20 +182,6 @@
 </p1510:revInfo>
 </file>
 
-<file path=ppt/comments/comment1.xml><?xml version="1.0" encoding="utf-8"?>
-<p:cmLst xmlns:a="http://schemas.openxmlformats.org/drawingml/2006/main" xmlns:r="http://schemas.openxmlformats.org/officeDocument/2006/relationships" xmlns:p="http://schemas.openxmlformats.org/presentationml/2006/main">
-  <p:cm authorId="3" dt="2018-05-01T19:55:09.513" idx="1">
-    <p:pos x="10" y="10"/>
-    <p:text>Sent meail to Michael and James re tech accuracy of this slide.</p:text>
-    <p:extLst>
-      <p:ext uri="{C676402C-5697-4E1C-873F-D02D1690AC5C}">
-        <p15:threadingInfo xmlns:p15="http://schemas.microsoft.com/office/powerpoint/2012/main" timeZoneBias="420"/>
-      </p:ext>
-    </p:extLst>
-  </p:cm>
-</p:cmLst>
-</file>
-
 <file path=ppt/notesMasters/notesMaster1.xml><?xml version="1.0" encoding="utf-8"?>
 <p:notesMaster xmlns:a="http://schemas.openxmlformats.org/drawingml/2006/main" xmlns:r="http://schemas.openxmlformats.org/officeDocument/2006/relationships" xmlns:p="http://schemas.openxmlformats.org/presentationml/2006/main">
   <p:cSld>
@@ -278,7 +264,7 @@
           <a:p>
             <a:fld id="{52A13B17-C506-4D51-BB37-16B365906619}" type="datetimeFigureOut">
               <a:rPr lang="en-US" smtClean="0"/>
-              <a:t>6/7/2018</a:t>
+              <a:t>6/11/2018</a:t>
             </a:fld>
             <a:endParaRPr lang="en-US"/>
           </a:p>
@@ -3116,7 +3102,7 @@
                   <a:prstClr val="black"/>
                 </a:solidFill>
               </a:rPr>
-              <a:t>6/7/2018 11:33 AM</a:t>
+              <a:t>6/11/2018 11:23 AM</a:t>
             </a:fld>
             <a:endParaRPr lang="en-US" dirty="0">
               <a:solidFill>
@@ -19150,8 +19136,13 @@
             </a:pPr>
             <a:r>
               <a:rPr lang="en-US" sz="2800" dirty="0"/>
-              <a:t>Can expand to other tenants for other countries in the region</a:t>
-            </a:r>
+              <a:t>Can expand to other tenants for other countries/regions in </a:t>
+            </a:r>
+            <a:r>
+              <a:rPr lang="en-US" sz="2800"/>
+              <a:t>the area</a:t>
+            </a:r>
+            <a:endParaRPr lang="en-US" sz="2800" dirty="0"/>
           </a:p>
           <a:p>
             <a:pPr marL="0" indent="0">
@@ -24805,21 +24796,21 @@
 </file>
 
 <file path=customXml/item1.xml><?xml version="1.0" encoding="utf-8"?>
+<p:properties xmlns:p="http://schemas.microsoft.com/office/2006/metadata/properties" xmlns:xsi="http://www.w3.org/2001/XMLSchema-instance" xmlns:pc="http://schemas.microsoft.com/office/infopath/2007/PartnerControls">
+  <documentManagement>
+    <_ip_UnifiedCompliancePolicyUIAction xmlns="http://schemas.microsoft.com/sharepoint/v3" xsi:nil="true"/>
+    <_ip_UnifiedCompliancePolicyProperties xmlns="http://schemas.microsoft.com/sharepoint/v3" xsi:nil="true"/>
+  </documentManagement>
+</p:properties>
+</file>
+
+<file path=customXml/item2.xml><?xml version="1.0" encoding="utf-8"?>
 <?mso-contentType ?>
 <FormTemplates xmlns="http://schemas.microsoft.com/sharepoint/v3/contenttype/forms">
   <Display>DocumentLibraryForm</Display>
   <Edit>DocumentLibraryForm</Edit>
   <New>DocumentLibraryForm</New>
 </FormTemplates>
-</file>
-
-<file path=customXml/item2.xml><?xml version="1.0" encoding="utf-8"?>
-<p:properties xmlns:p="http://schemas.microsoft.com/office/2006/metadata/properties" xmlns:xsi="http://www.w3.org/2001/XMLSchema-instance" xmlns:pc="http://schemas.microsoft.com/office/infopath/2007/PartnerControls">
-  <documentManagement>
-    <_ip_UnifiedCompliancePolicyUIAction xmlns="http://schemas.microsoft.com/sharepoint/v3" xsi:nil="true"/>
-    <_ip_UnifiedCompliancePolicyProperties xmlns="http://schemas.microsoft.com/sharepoint/v3" xsi:nil="true"/>
-  </documentManagement>
-</p:properties>
 </file>
 
 <file path=customXml/item3.xml><?xml version="1.0" encoding="utf-8"?>
@@ -25025,27 +25016,27 @@
 </file>
 
 <file path=customXml/itemProps1.xml><?xml version="1.0" encoding="utf-8"?>
-<ds:datastoreItem xmlns:ds="http://schemas.openxmlformats.org/officeDocument/2006/customXml" ds:itemID="{F18501AF-04CF-4482-BAE1-607B49DDC378}">
+<ds:datastoreItem xmlns:ds="http://schemas.openxmlformats.org/officeDocument/2006/customXml" ds:itemID="{BAF7D529-36AB-45DA-B239-2F912F2D1610}">
   <ds:schemaRefs>
-    <ds:schemaRef ds:uri="http://schemas.microsoft.com/sharepoint/v3/contenttype/forms"/>
+    <ds:schemaRef ds:uri="http://purl.org/dc/dcmitype/"/>
+    <ds:schemaRef ds:uri="http://schemas.microsoft.com/office/2006/metadata/properties"/>
+    <ds:schemaRef ds:uri="http://purl.org/dc/elements/1.1/"/>
+    <ds:schemaRef ds:uri="http://schemas.microsoft.com/sharepoint/v3"/>
+    <ds:schemaRef ds:uri="http://schemas.openxmlformats.org/package/2006/metadata/core-properties"/>
+    <ds:schemaRef ds:uri="http://purl.org/dc/terms/"/>
+    <ds:schemaRef ds:uri="http://schemas.microsoft.com/office/infopath/2007/PartnerControls"/>
+    <ds:schemaRef ds:uri="http://schemas.microsoft.com/office/2006/documentManagement/types"/>
+    <ds:schemaRef ds:uri="d9c797ad-d7c3-4982-82b7-81352a75e4a5"/>
+    <ds:schemaRef ds:uri="2023ac63-7b75-4916-a9ee-591457758eee"/>
+    <ds:schemaRef ds:uri="http://www.w3.org/XML/1998/namespace"/>
   </ds:schemaRefs>
 </ds:datastoreItem>
 </file>
 
 <file path=customXml/itemProps2.xml><?xml version="1.0" encoding="utf-8"?>
-<ds:datastoreItem xmlns:ds="http://schemas.openxmlformats.org/officeDocument/2006/customXml" ds:itemID="{BAF7D529-36AB-45DA-B239-2F912F2D1610}">
+<ds:datastoreItem xmlns:ds="http://schemas.openxmlformats.org/officeDocument/2006/customXml" ds:itemID="{F18501AF-04CF-4482-BAE1-607B49DDC378}">
   <ds:schemaRefs>
-    <ds:schemaRef ds:uri="http://purl.org/dc/terms/"/>
-    <ds:schemaRef ds:uri="http://schemas.openxmlformats.org/package/2006/metadata/core-properties"/>
-    <ds:schemaRef ds:uri="http://purl.org/dc/dcmitype/"/>
-    <ds:schemaRef ds:uri="http://schemas.microsoft.com/office/infopath/2007/PartnerControls"/>
-    <ds:schemaRef ds:uri="2023ac63-7b75-4916-a9ee-591457758eee"/>
-    <ds:schemaRef ds:uri="http://purl.org/dc/elements/1.1/"/>
-    <ds:schemaRef ds:uri="http://schemas.microsoft.com/office/2006/metadata/properties"/>
-    <ds:schemaRef ds:uri="http://schemas.microsoft.com/office/2006/documentManagement/types"/>
-    <ds:schemaRef ds:uri="http://schemas.microsoft.com/sharepoint/v3"/>
-    <ds:schemaRef ds:uri="d9c797ad-d7c3-4982-82b7-81352a75e4a5"/>
-    <ds:schemaRef ds:uri="http://www.w3.org/XML/1998/namespace"/>
+    <ds:schemaRef ds:uri="http://schemas.microsoft.com/sharepoint/v3/contenttype/forms"/>
   </ds:schemaRefs>
 </ds:datastoreItem>
 </file>

</xml_diff>

<commit_message>
Fixed versioning error to ensure all alt text was correct
</commit_message>
<xml_diff>
--- a/WDS/Whiteboard design session trainer presentation - Azure Stack.pptx
+++ b/WDS/Whiteboard design session trainer presentation - Azure Stack.pptx
@@ -1,47 +1,47 @@
 
 <file path=ppt/presentation.xml><?xml version="1.0" encoding="utf-8"?>
-<p:presentation xmlns:a="http://schemas.openxmlformats.org/drawingml/2006/main" xmlns:r="http://schemas.openxmlformats.org/officeDocument/2006/relationships" xmlns:p="http://schemas.openxmlformats.org/presentationml/2006/main" saveSubsetFonts="1">
+<p:presentation xmlns:a="http://schemas.openxmlformats.org/drawingml/2006/main" xmlns:r="http://schemas.openxmlformats.org/officeDocument/2006/relationships" xmlns:p="http://schemas.openxmlformats.org/presentationml/2006/main" removePersonalInfoOnSave="1" saveSubsetFonts="1">
   <p:sldMasterIdLst>
-    <p:sldMasterId id="2147483660" r:id="rId4"/>
-    <p:sldMasterId id="2147483665" r:id="rId5"/>
+    <p:sldMasterId id="2147483660" r:id="rId1"/>
+    <p:sldMasterId id="2147483665" r:id="rId2"/>
   </p:sldMasterIdLst>
   <p:notesMasterIdLst>
-    <p:notesMasterId r:id="rId39"/>
+    <p:notesMasterId r:id="rId36"/>
   </p:notesMasterIdLst>
   <p:sldIdLst>
-    <p:sldId id="300" r:id="rId6"/>
-    <p:sldId id="323" r:id="rId7"/>
-    <p:sldId id="302" r:id="rId8"/>
-    <p:sldId id="259" r:id="rId9"/>
-    <p:sldId id="324" r:id="rId10"/>
-    <p:sldId id="354" r:id="rId11"/>
-    <p:sldId id="327" r:id="rId12"/>
-    <p:sldId id="361" r:id="rId13"/>
-    <p:sldId id="326" r:id="rId14"/>
-    <p:sldId id="330" r:id="rId15"/>
-    <p:sldId id="303" r:id="rId16"/>
-    <p:sldId id="331" r:id="rId17"/>
-    <p:sldId id="305" r:id="rId18"/>
-    <p:sldId id="320" r:id="rId19"/>
-    <p:sldId id="322" r:id="rId20"/>
-    <p:sldId id="321" r:id="rId21"/>
-    <p:sldId id="317" r:id="rId22"/>
-    <p:sldId id="338" r:id="rId23"/>
-    <p:sldId id="343" r:id="rId24"/>
-    <p:sldId id="357" r:id="rId25"/>
-    <p:sldId id="340" r:id="rId26"/>
-    <p:sldId id="359" r:id="rId27"/>
-    <p:sldId id="360" r:id="rId28"/>
-    <p:sldId id="358" r:id="rId29"/>
-    <p:sldId id="362" r:id="rId30"/>
-    <p:sldId id="342" r:id="rId31"/>
-    <p:sldId id="356" r:id="rId32"/>
-    <p:sldId id="349" r:id="rId33"/>
-    <p:sldId id="352" r:id="rId34"/>
-    <p:sldId id="353" r:id="rId35"/>
-    <p:sldId id="351" r:id="rId36"/>
-    <p:sldId id="318" r:id="rId37"/>
-    <p:sldId id="315" r:id="rId38"/>
+    <p:sldId id="300" r:id="rId3"/>
+    <p:sldId id="323" r:id="rId4"/>
+    <p:sldId id="302" r:id="rId5"/>
+    <p:sldId id="259" r:id="rId6"/>
+    <p:sldId id="324" r:id="rId7"/>
+    <p:sldId id="354" r:id="rId8"/>
+    <p:sldId id="327" r:id="rId9"/>
+    <p:sldId id="361" r:id="rId10"/>
+    <p:sldId id="326" r:id="rId11"/>
+    <p:sldId id="330" r:id="rId12"/>
+    <p:sldId id="303" r:id="rId13"/>
+    <p:sldId id="331" r:id="rId14"/>
+    <p:sldId id="305" r:id="rId15"/>
+    <p:sldId id="320" r:id="rId16"/>
+    <p:sldId id="322" r:id="rId17"/>
+    <p:sldId id="321" r:id="rId18"/>
+    <p:sldId id="317" r:id="rId19"/>
+    <p:sldId id="338" r:id="rId20"/>
+    <p:sldId id="343" r:id="rId21"/>
+    <p:sldId id="357" r:id="rId22"/>
+    <p:sldId id="340" r:id="rId23"/>
+    <p:sldId id="359" r:id="rId24"/>
+    <p:sldId id="360" r:id="rId25"/>
+    <p:sldId id="358" r:id="rId26"/>
+    <p:sldId id="362" r:id="rId27"/>
+    <p:sldId id="342" r:id="rId28"/>
+    <p:sldId id="356" r:id="rId29"/>
+    <p:sldId id="349" r:id="rId30"/>
+    <p:sldId id="352" r:id="rId31"/>
+    <p:sldId id="353" r:id="rId32"/>
+    <p:sldId id="351" r:id="rId33"/>
+    <p:sldId id="318" r:id="rId34"/>
+    <p:sldId id="315" r:id="rId35"/>
   </p:sldIdLst>
   <p:sldSz cx="12192000" cy="6858000"/>
   <p:notesSz cx="6858000" cy="9144000"/>
@@ -144,33 +144,16 @@
     <p:ext uri="{EFAFB233-063F-42B5-8137-9DF3F51BA10A}">
       <p15:sldGuideLst xmlns:p15="http://schemas.microsoft.com/office/powerpoint/2012/main"/>
     </p:ext>
+    <p:ext uri="{2D200454-40CA-4A62-9FC3-DE9A4176ACB9}">
+      <p15:notesGuideLst xmlns:p15="http://schemas.microsoft.com/office/powerpoint/2012/main"/>
+    </p:ext>
   </p:extLst>
 </p:presentation>
 </file>
 
 <file path=ppt/commentAuthors.xml><?xml version="1.0" encoding="utf-8"?>
 <p:cmAuthorLst xmlns:a="http://schemas.openxmlformats.org/drawingml/2006/main" xmlns:r="http://schemas.openxmlformats.org/officeDocument/2006/relationships" xmlns:p="http://schemas.openxmlformats.org/presentationml/2006/main">
-  <p:cmAuthor id="1" name="Steve Buchanan" initials="SB" lastIdx="2" clrIdx="0">
-    <p:extLst>
-      <p:ext uri="{19B8F6BF-5375-455C-9EA6-DF929625EA0E}">
-        <p15:presenceInfo xmlns:p15="http://schemas.microsoft.com/office/powerpoint/2012/main" userId="75e6bc1c2aa61b7a" providerId="Windows Live"/>
-      </p:ext>
-    </p:extLst>
-  </p:cmAuthor>
-  <p:cmAuthor id="2" name="James Burleson" initials="JB" lastIdx="1" clrIdx="1">
-    <p:extLst>
-      <p:ext uri="{19B8F6BF-5375-455C-9EA6-DF929625EA0E}">
-        <p15:presenceInfo xmlns:p15="http://schemas.microsoft.com/office/powerpoint/2012/main" userId="James Burleson" providerId="None"/>
-      </p:ext>
-    </p:extLst>
-  </p:cmAuthor>
-  <p:cmAuthor id="3" name="Sandy Alto (GP Strategies Corporation)" initials="SA(SC" lastIdx="1" clrIdx="2">
-    <p:extLst>
-      <p:ext uri="{19B8F6BF-5375-455C-9EA6-DF929625EA0E}">
-        <p15:presenceInfo xmlns:p15="http://schemas.microsoft.com/office/powerpoint/2012/main" userId="S-1-5-21-2127521184-1604012920-1887927527-29333883" providerId="AD"/>
-      </p:ext>
-    </p:extLst>
-  </p:cmAuthor>
+  <p:cmAuthor id="4" name="Author" initials="A" lastIdx="0" clrIdx="3"/>
 </p:cmAuthorLst>
 </file>
 
@@ -178,6 +161,7 @@
 <p1510:revInfo xmlns:a="http://schemas.openxmlformats.org/drawingml/2006/main" xmlns:r="http://schemas.openxmlformats.org/officeDocument/2006/relationships" xmlns:p1510="http://schemas.microsoft.com/office/powerpoint/2015/10/main">
   <p1510:revLst>
     <p1510:client id="{D8E47FE5-9C48-442E-BEE4-0E76DDF939BF}" v="1" dt="2018-05-08T17:30:14.592"/>
+    <p1510:client id="{E751B45D-8D24-4A38-A964-EB6CA9396333}" v="1" dt="2018-05-08T17:49:46.861"/>
   </p1510:revLst>
 </p1510:revInfo>
 </file>
@@ -576,7 +560,7 @@
           <a:lstStyle/>
           <a:p>
             <a:r>
-              <a:rPr lang="en-US" sz="1200" kern="1200" dirty="0">
+              <a:rPr lang="en-US" sz="950" kern="1200" dirty="0">
                 <a:solidFill>
                   <a:schemeClr val="tx1"/>
                 </a:solidFill>
@@ -590,7 +574,7 @@
           </a:p>
           <a:p>
             <a:r>
-              <a:rPr lang="en-US" sz="1200" kern="1200" dirty="0">
+              <a:rPr lang="en-US" sz="950" kern="1200" dirty="0">
                 <a:solidFill>
                   <a:schemeClr val="tx1"/>
                 </a:solidFill>
@@ -604,7 +588,7 @@
           </a:p>
           <a:p>
             <a:r>
-              <a:rPr lang="en-US" sz="1200" kern="1200" dirty="0">
+              <a:rPr lang="en-US" sz="950" kern="1200" dirty="0">
                 <a:solidFill>
                   <a:schemeClr val="tx1"/>
                 </a:solidFill>
@@ -618,7 +602,7 @@
           </a:p>
           <a:p>
             <a:r>
-              <a:rPr lang="en-US" sz="1200" kern="1200" dirty="0">
+              <a:rPr lang="en-US" sz="950" kern="1200" dirty="0">
                 <a:solidFill>
                   <a:schemeClr val="tx1"/>
                 </a:solidFill>
@@ -632,7 +616,7 @@
           </a:p>
           <a:p>
             <a:r>
-              <a:rPr lang="en-US" sz="1200" kern="1200" dirty="0">
+              <a:rPr lang="en-US" sz="950" kern="1200" dirty="0">
                 <a:solidFill>
                   <a:schemeClr val="tx1"/>
                 </a:solidFill>
@@ -644,7 +628,7 @@
               <a:t>Microsoft and the trademarks listed at </a:t>
             </a:r>
             <a:r>
-              <a:rPr lang="en-US" sz="1200" u="sng" kern="1200" dirty="0">
+              <a:rPr lang="en-US" sz="950" u="sng" kern="1200" dirty="0">
                 <a:solidFill>
                   <a:schemeClr val="tx1"/>
                 </a:solidFill>
@@ -657,7 +641,7 @@
               <a:t>https://www.microsoft.com/en-us/legal/intellectualproperty/Trademarks/Usage/General.aspx</a:t>
             </a:r>
             <a:r>
-              <a:rPr lang="en-US" sz="1200" kern="1200" dirty="0">
+              <a:rPr lang="en-US" sz="950" kern="1200" dirty="0">
                 <a:solidFill>
                   <a:schemeClr val="tx1"/>
                 </a:solidFill>
@@ -668,34 +652,6 @@
               </a:rPr>
               <a:t> are trademarks of the Microsoft group of companies. All other trademarks are property of their respective owners.</a:t>
             </a:r>
-          </a:p>
-          <a:p>
-            <a:br>
-              <a:rPr lang="en-US" sz="1200" kern="1200">
-                <a:solidFill>
-                  <a:schemeClr val="tx1"/>
-                </a:solidFill>
-                <a:effectLst/>
-                <a:latin typeface="+mn-lt"/>
-                <a:ea typeface="+mn-ea"/>
-                <a:cs typeface="+mn-cs"/>
-              </a:rPr>
-            </a:br>
-            <a:r>
-              <a:rPr lang="en-US" sz="1200" kern="1200">
-                <a:solidFill>
-                  <a:schemeClr val="tx1"/>
-                </a:solidFill>
-                <a:effectLst/>
-                <a:latin typeface="+mn-lt"/>
-                <a:ea typeface="+mn-ea"/>
-                <a:cs typeface="+mn-cs"/>
-              </a:rPr>
-              <a:t> </a:t>
-            </a:r>
-          </a:p>
-          <a:p>
-            <a:endParaRPr lang="en-US" dirty="0"/>
           </a:p>
         </p:txBody>
       </p:sp>
@@ -3102,7 +3058,7 @@
                   <a:prstClr val="black"/>
                 </a:solidFill>
               </a:rPr>
-              <a:t>6/11/2018 11:23 AM</a:t>
+              <a:t>6/11/2018 12:08 PM</a:t>
             </a:fld>
             <a:endParaRPr lang="en-US" dirty="0">
               <a:solidFill>
@@ -3140,60 +3096,6 @@
               <a:solidFill>
                 <a:prstClr val="black"/>
               </a:solidFill>
-            </a:endParaRPr>
-          </a:p>
-        </p:txBody>
-      </p:sp>
-      <p:sp>
-        <p:nvSpPr>
-          <p:cNvPr id="6" name="Footer Placeholder 5"/>
-          <p:cNvSpPr>
-            <a:spLocks noGrp="1"/>
-          </p:cNvSpPr>
-          <p:nvPr>
-            <p:ph type="ftr" sz="quarter" idx="14"/>
-          </p:nvPr>
-        </p:nvSpPr>
-        <p:spPr/>
-        <p:txBody>
-          <a:bodyPr/>
-          <a:lstStyle/>
-          <a:p>
-            <a:pPr defTabSz="914099" eaLnBrk="0" hangingPunct="0"/>
-            <a:r>
-              <a:rPr lang="en-US" sz="400">
-                <a:gradFill>
-                  <a:gsLst>
-                    <a:gs pos="0">
-                      <a:prstClr val="black"/>
-                    </a:gs>
-                    <a:gs pos="100000">
-                      <a:prstClr val="black"/>
-                    </a:gs>
-                  </a:gsLst>
-                  <a:lin ang="5400000" scaled="0"/>
-                </a:gradFill>
-                <a:latin typeface="Segoe UI" pitchFamily="34" charset="0"/>
-                <a:ea typeface="Segoe UI" pitchFamily="34" charset="0"/>
-                <a:cs typeface="Segoe UI" pitchFamily="34" charset="0"/>
-              </a:rPr>
-              <a:t>© Microsoft Corporation. All rights reserved. MICROSOFT MAKES NO WARRANTIES, EXPRESS, IMPLIED OR STATUTORY, AS TO THE INFORMATION IN THIS PRESENTATION.</a:t>
-            </a:r>
-            <a:endParaRPr lang="en-US" sz="400" dirty="0">
-              <a:gradFill>
-                <a:gsLst>
-                  <a:gs pos="0">
-                    <a:prstClr val="black"/>
-                  </a:gs>
-                  <a:gs pos="100000">
-                    <a:prstClr val="black"/>
-                  </a:gs>
-                </a:gsLst>
-                <a:lin ang="5400000" scaled="0"/>
-              </a:gradFill>
-              <a:latin typeface="Segoe UI" pitchFamily="34" charset="0"/>
-              <a:ea typeface="Segoe UI" pitchFamily="34" charset="0"/>
-              <a:cs typeface="Segoe UI" pitchFamily="34" charset="0"/>
             </a:endParaRPr>
           </a:p>
         </p:txBody>
@@ -3852,7 +3754,7 @@
           <a:lstStyle/>
           <a:p>
             <a:r>
-              <a:rPr>
+              <a:rPr dirty="0">
                 <a:gradFill>
                   <a:gsLst>
                     <a:gs pos="2239">
@@ -13009,61 +12911,6 @@
           </p:txBody>
         </p:sp>
       </p:grpSp>
-      <p:sp>
-        <p:nvSpPr>
-          <p:cNvPr id="8" name="Text Box 3"/>
-          <p:cNvSpPr txBox="1">
-            <a:spLocks noChangeArrowheads="1"/>
-          </p:cNvSpPr>
-          <p:nvPr userDrawn="1"/>
-        </p:nvSpPr>
-        <p:spPr bwMode="blackWhite">
-          <a:xfrm>
-            <a:off x="269240" y="6099190"/>
-            <a:ext cx="4482124" cy="467742"/>
-          </a:xfrm>
-          <a:prstGeom prst="rect">
-            <a:avLst/>
-          </a:prstGeom>
-          <a:noFill/>
-          <a:ln w="12700">
-            <a:noFill/>
-            <a:miter lim="800000"/>
-            <a:headEnd type="none" w="sm" len="sm"/>
-            <a:tailEnd type="none" w="sm" len="sm"/>
-          </a:ln>
-          <a:effectLst/>
-        </p:spPr>
-        <p:txBody>
-          <a:bodyPr vert="horz" wrap="square" lIns="179285" tIns="179285" rIns="179285" bIns="179285" numCol="1" anchor="t" anchorCtr="0" compatLnSpc="1">
-            <a:prstTxWarp prst="textNoShape">
-              <a:avLst/>
-            </a:prstTxWarp>
-            <a:spAutoFit/>
-          </a:bodyPr>
-          <a:lstStyle/>
-          <a:p>
-            <a:pPr defTabSz="913924" eaLnBrk="0" hangingPunct="0"/>
-            <a:r>
-              <a:rPr lang="en-US" sz="686" dirty="0">
-                <a:gradFill>
-                  <a:gsLst>
-                    <a:gs pos="0">
-                      <a:schemeClr val="tx1"/>
-                    </a:gs>
-                    <a:gs pos="100000">
-                      <a:schemeClr val="tx1"/>
-                    </a:gs>
-                  </a:gsLst>
-                  <a:lin ang="5400000" scaled="0"/>
-                </a:gradFill>
-                <a:cs typeface="Segoe UI" pitchFamily="34" charset="0"/>
-              </a:rPr>
-              <a:t>© Copyright Microsoft Corporation. All rights reserved. </a:t>
-            </a:r>
-          </a:p>
-        </p:txBody>
-      </p:sp>
     </p:spTree>
     <p:extLst>
       <p:ext uri="{BB962C8B-B14F-4D97-AF65-F5344CB8AC3E}">
@@ -14507,7 +14354,7 @@
           </a:lstStyle>
           <a:p>
             <a:r>
-              <a:rPr>
+              <a:rPr dirty="0">
                 <a:gradFill>
                   <a:gsLst>
                     <a:gs pos="2239">
@@ -16733,7 +16580,7 @@
       </p:sp>
       <p:pic>
         <p:nvPicPr>
-          <p:cNvPr id="6" name="Picture 5">
+          <p:cNvPr id="6" name="Picture 5" descr="In the Infographic for Common scenarios, Microsoft Azure (public) is connected to the Microsoft Azure Stoack (private / hosted) through Developers and IT." title="Infographic for Common scenarios ">
             <a:extLst>
               <a:ext uri="{FF2B5EF4-FFF2-40B4-BE49-F238E27FC236}">
                 <a16:creationId xmlns:a16="http://schemas.microsoft.com/office/drawing/2014/main" id="{6C14C21A-C3BB-49F2-9B3E-E7E07FD9E42F}"/>
@@ -18475,7 +18322,7 @@
       </p:sp>
       <p:pic>
         <p:nvPicPr>
-          <p:cNvPr id="7" name="Picture 6">
+          <p:cNvPr id="7" name="Picture 6" descr="Both Traffic manager and VPN connect Azure Public (South Central) with the Azure Stock FusionTomo Dallas Datacenter, which in turn connects via VPN to On-Premises." title="Preferred solution">
             <a:extLst>
               <a:ext uri="{FF2B5EF4-FFF2-40B4-BE49-F238E27FC236}">
                 <a16:creationId xmlns:a16="http://schemas.microsoft.com/office/drawing/2014/main" id="{9A116A74-914E-40CA-BE1D-2A3A13F7C6B9}"/>
@@ -19136,13 +18983,8 @@
             </a:pPr>
             <a:r>
               <a:rPr lang="en-US" sz="2800" dirty="0"/>
-              <a:t>Can expand to other tenants for other countries/regions in </a:t>
-            </a:r>
-            <a:r>
-              <a:rPr lang="en-US" sz="2800"/>
-              <a:t>the area</a:t>
-            </a:r>
-            <a:endParaRPr lang="en-US" sz="2800" dirty="0"/>
+              <a:t>Can expand to other tenants for other countries/regions in the area</a:t>
+            </a:r>
           </a:p>
           <a:p>
             <a:pPr marL="0" indent="0">
@@ -20051,9 +19893,7 @@
           </a:xfrm>
         </p:spPr>
         <p:txBody>
-          <a:bodyPr vert="horz" wrap="square" lIns="146304" tIns="91440" rIns="146304" bIns="91440" rtlCol="0" anchor="t">
-            <a:spAutoFit/>
-          </a:bodyPr>
+          <a:bodyPr/>
           <a:lstStyle/>
           <a:p>
             <a:pPr marL="0" indent="0">
@@ -20080,24 +19920,18 @@
             </a:r>
           </a:p>
           <a:p>
-            <a:pPr marL="572135" lvl="1" indent="-236220"/>
+            <a:pPr lvl="1"/>
             <a:r>
               <a:rPr lang="en-US" sz="2800" dirty="0"/>
               <a:t>The SQL Server RP will installed and made available.</a:t>
             </a:r>
-            <a:endParaRPr lang="en-US" sz="2800" dirty="0">
-              <a:cs typeface="Segoe UI Semilight"/>
-            </a:endParaRPr>
-          </a:p>
-          <a:p>
-            <a:pPr marL="572135" lvl="1" indent="-236220"/>
+          </a:p>
+          <a:p>
+            <a:pPr lvl="1"/>
             <a:r>
               <a:rPr lang="en-US" sz="2800" dirty="0"/>
               <a:t>The Azure App Service RP will installed and made available.</a:t>
             </a:r>
-            <a:endParaRPr lang="en-US" sz="2800" dirty="0">
-              <a:cs typeface="Segoe UI Semilight"/>
-            </a:endParaRPr>
           </a:p>
           <a:p>
             <a:pPr lvl="1"/>
@@ -20474,7 +20308,7 @@
       </p:sp>
       <p:pic>
         <p:nvPicPr>
-          <p:cNvPr id="6" name="Picture 5">
+          <p:cNvPr id="6" name="Picture 5" descr="The Azure Stack Taxonomy has Region, Tenant, Subscription, Offer, Plan, and Services." title="Azure Stack taxonomy">
             <a:extLst>
               <a:ext uri="{FF2B5EF4-FFF2-40B4-BE49-F238E27FC236}">
                 <a16:creationId xmlns:a16="http://schemas.microsoft.com/office/drawing/2014/main" id="{A5FAFEA0-0A2A-4C09-B865-9838C38C0F50}"/>
@@ -20635,79 +20469,100 @@
           </a:p>
         </p:txBody>
       </p:sp>
-      <p:pic>
-        <p:nvPicPr>
-          <p:cNvPr id="5" name="Picture 4">
+      <p:grpSp>
+        <p:nvGrpSpPr>
+          <p:cNvPr id="4" name="Group 3" descr="Product icons" title="Product icons">
             <a:extLst>
               <a:ext uri="{FF2B5EF4-FFF2-40B4-BE49-F238E27FC236}">
-                <a16:creationId xmlns:a16="http://schemas.microsoft.com/office/drawing/2014/main" id="{91898400-8E09-4BC6-B908-5D552E09DE7C}"/>
+                <a16:creationId xmlns:a16="http://schemas.microsoft.com/office/drawing/2014/main" id="{F52860B9-6B4D-4AC6-BC8D-930AC81FC3A7}"/>
               </a:ext>
             </a:extLst>
           </p:cNvPr>
-          <p:cNvPicPr>
-            <a:picLocks noChangeAspect="1"/>
-          </p:cNvPicPr>
+          <p:cNvGrpSpPr/>
           <p:nvPr/>
-        </p:nvPicPr>
-        <p:blipFill>
-          <a:blip r:embed="rId3" cstate="print">
-            <a:extLst>
-              <a:ext uri="{28A0092B-C50C-407E-A947-70E740481C1C}">
-                <a14:useLocalDpi xmlns:a14="http://schemas.microsoft.com/office/drawing/2010/main" val="0"/>
-              </a:ext>
-            </a:extLst>
-          </a:blip>
-          <a:stretch>
-            <a:fillRect/>
-          </a:stretch>
-        </p:blipFill>
-        <p:spPr>
+        </p:nvGrpSpPr>
+        <p:grpSpPr>
           <a:xfrm>
-            <a:off x="9025525" y="3429000"/>
-            <a:ext cx="2083507" cy="2083507"/>
+            <a:off x="9025525" y="1184706"/>
+            <a:ext cx="2083508" cy="4327801"/>
+            <a:chOff x="9025525" y="1184706"/>
+            <a:chExt cx="2083508" cy="4327801"/>
           </a:xfrm>
-          <a:prstGeom prst="rect">
-            <a:avLst/>
-          </a:prstGeom>
-        </p:spPr>
-      </p:pic>
-      <p:pic>
-        <p:nvPicPr>
-          <p:cNvPr id="7" name="Picture 6">
-            <a:extLst>
-              <a:ext uri="{FF2B5EF4-FFF2-40B4-BE49-F238E27FC236}">
-                <a16:creationId xmlns:a16="http://schemas.microsoft.com/office/drawing/2014/main" id="{8C541AF4-D001-426F-81D4-C8594B9F4DDA}"/>
-              </a:ext>
-            </a:extLst>
-          </p:cNvPr>
-          <p:cNvPicPr>
-            <a:picLocks noChangeAspect="1"/>
-          </p:cNvPicPr>
-          <p:nvPr/>
-        </p:nvPicPr>
-        <p:blipFill>
-          <a:blip r:embed="rId4" cstate="print">
-            <a:biLevel thresh="25000"/>
-            <a:extLst>
-              <a:ext uri="{28A0092B-C50C-407E-A947-70E740481C1C}">
-                <a14:useLocalDpi xmlns:a14="http://schemas.microsoft.com/office/drawing/2010/main" val="0"/>
-              </a:ext>
-            </a:extLst>
-          </a:blip>
-          <a:stretch>
-            <a:fillRect/>
-          </a:stretch>
-        </p:blipFill>
-        <p:spPr>
-          <a:xfrm>
-            <a:off x="9025526" y="1184706"/>
-            <a:ext cx="2083507" cy="2083507"/>
-          </a:xfrm>
-          <a:prstGeom prst="rect">
-            <a:avLst/>
-          </a:prstGeom>
-        </p:spPr>
-      </p:pic>
+        </p:grpSpPr>
+        <p:pic>
+          <p:nvPicPr>
+            <p:cNvPr id="5" name="Picture 4" descr="Visual Studio code icon" title="Visual Studio code icon">
+              <a:extLst>
+                <a:ext uri="{FF2B5EF4-FFF2-40B4-BE49-F238E27FC236}">
+                  <a16:creationId xmlns:a16="http://schemas.microsoft.com/office/drawing/2014/main" id="{91898400-8E09-4BC6-B908-5D552E09DE7C}"/>
+                </a:ext>
+              </a:extLst>
+            </p:cNvPr>
+            <p:cNvPicPr>
+              <a:picLocks noChangeAspect="1"/>
+            </p:cNvPicPr>
+            <p:nvPr/>
+          </p:nvPicPr>
+          <p:blipFill>
+            <a:blip r:embed="rId3" cstate="print">
+              <a:extLst>
+                <a:ext uri="{28A0092B-C50C-407E-A947-70E740481C1C}">
+                  <a14:useLocalDpi xmlns:a14="http://schemas.microsoft.com/office/drawing/2010/main" val="0"/>
+                </a:ext>
+              </a:extLst>
+            </a:blip>
+            <a:stretch>
+              <a:fillRect/>
+            </a:stretch>
+          </p:blipFill>
+          <p:spPr>
+            <a:xfrm>
+              <a:off x="9025525" y="3429000"/>
+              <a:ext cx="2083507" cy="2083507"/>
+            </a:xfrm>
+            <a:prstGeom prst="rect">
+              <a:avLst/>
+            </a:prstGeom>
+          </p:spPr>
+        </p:pic>
+        <p:pic>
+          <p:nvPicPr>
+            <p:cNvPr id="7" name="Picture 6" descr="ARM template icon" title="ARM template icon">
+              <a:extLst>
+                <a:ext uri="{FF2B5EF4-FFF2-40B4-BE49-F238E27FC236}">
+                  <a16:creationId xmlns:a16="http://schemas.microsoft.com/office/drawing/2014/main" id="{8C541AF4-D001-426F-81D4-C8594B9F4DDA}"/>
+                </a:ext>
+              </a:extLst>
+            </p:cNvPr>
+            <p:cNvPicPr>
+              <a:picLocks noChangeAspect="1"/>
+            </p:cNvPicPr>
+            <p:nvPr/>
+          </p:nvPicPr>
+          <p:blipFill>
+            <a:blip r:embed="rId4" cstate="print">
+              <a:biLevel thresh="25000"/>
+              <a:extLst>
+                <a:ext uri="{28A0092B-C50C-407E-A947-70E740481C1C}">
+                  <a14:useLocalDpi xmlns:a14="http://schemas.microsoft.com/office/drawing/2010/main" val="0"/>
+                </a:ext>
+              </a:extLst>
+            </a:blip>
+            <a:stretch>
+              <a:fillRect/>
+            </a:stretch>
+          </p:blipFill>
+          <p:spPr>
+            <a:xfrm>
+              <a:off x="9025526" y="1184706"/>
+              <a:ext cx="2083507" cy="2083507"/>
+            </a:xfrm>
+            <a:prstGeom prst="rect">
+              <a:avLst/>
+            </a:prstGeom>
+          </p:spPr>
+        </p:pic>
+      </p:grpSp>
     </p:spTree>
     <p:extLst>
       <p:ext uri="{BB962C8B-B14F-4D97-AF65-F5344CB8AC3E}">
@@ -23641,10 +23496,10 @@
       </p:sp>
       <p:pic>
         <p:nvPicPr>
-          <p:cNvPr id="6" name="Picture 5" descr="Diagram indicating the customer situation. Shows how data from Contoso mortgage customers moves from public facing web servers to a queue and from there move to application servers and SQL (sequel) servers.">
+          <p:cNvPr id="5" name="Picture 4" descr="Contoso Dallas Data Center diagram&#10;&#10;The Contoso Dallas Data Center diagram shows the flow between Contoso Mortgage customers and Contoso's web servers, application servers, and SQL servers.">
             <a:extLst>
               <a:ext uri="{FF2B5EF4-FFF2-40B4-BE49-F238E27FC236}">
-                <a16:creationId xmlns:a16="http://schemas.microsoft.com/office/drawing/2014/main" id="{5A395316-1127-4EA2-BC4A-8775A66C7EC1}"/>
+                <a16:creationId xmlns:a16="http://schemas.microsoft.com/office/drawing/2014/main" id="{C6C5C947-BBB0-44A3-BF84-1722CB44FCA9}"/>
               </a:ext>
             </a:extLst>
           </p:cNvPr>
@@ -23654,14 +23509,20 @@
           <p:nvPr/>
         </p:nvPicPr>
         <p:blipFill rotWithShape="1">
-          <a:blip r:embed="rId3"/>
-          <a:srcRect l="1442" r="2955"/>
+          <a:blip r:embed="rId3">
+            <a:extLst>
+              <a:ext uri="{28A0092B-C50C-407E-A947-70E740481C1C}">
+                <a14:useLocalDpi xmlns:a14="http://schemas.microsoft.com/office/drawing/2010/main" val="0"/>
+              </a:ext>
+            </a:extLst>
+          </a:blip>
+          <a:srcRect r="1129"/>
           <a:stretch/>
         </p:blipFill>
         <p:spPr>
           <a:xfrm>
-            <a:off x="268080" y="1189176"/>
-            <a:ext cx="11655840" cy="4974897"/>
+            <a:off x="0" y="1075178"/>
+            <a:ext cx="12054348" cy="4963282"/>
           </a:xfrm>
           <a:prstGeom prst="rect">
             <a:avLst/>
@@ -24793,270 +24654,4 @@
     </a:ext>
   </a:extLst>
 </a:theme>
-</file>
-
-<file path=customXml/item1.xml><?xml version="1.0" encoding="utf-8"?>
-<p:properties xmlns:p="http://schemas.microsoft.com/office/2006/metadata/properties" xmlns:xsi="http://www.w3.org/2001/XMLSchema-instance" xmlns:pc="http://schemas.microsoft.com/office/infopath/2007/PartnerControls">
-  <documentManagement>
-    <_ip_UnifiedCompliancePolicyUIAction xmlns="http://schemas.microsoft.com/sharepoint/v3" xsi:nil="true"/>
-    <_ip_UnifiedCompliancePolicyProperties xmlns="http://schemas.microsoft.com/sharepoint/v3" xsi:nil="true"/>
-  </documentManagement>
-</p:properties>
-</file>
-
-<file path=customXml/item2.xml><?xml version="1.0" encoding="utf-8"?>
-<?mso-contentType ?>
-<FormTemplates xmlns="http://schemas.microsoft.com/sharepoint/v3/contenttype/forms">
-  <Display>DocumentLibraryForm</Display>
-  <Edit>DocumentLibraryForm</Edit>
-  <New>DocumentLibraryForm</New>
-</FormTemplates>
-</file>
-
-<file path=customXml/item3.xml><?xml version="1.0" encoding="utf-8"?>
-<ct:contentTypeSchema xmlns:ct="http://schemas.microsoft.com/office/2006/metadata/contentType" xmlns:ma="http://schemas.microsoft.com/office/2006/metadata/properties/metaAttributes" ct:_="" ma:_="" ma:contentTypeName="Document" ma:contentTypeID="0x010100D15DFA3690A15B4081582BBCC6BEAC3E" ma:contentTypeVersion="9" ma:contentTypeDescription="Create a new document." ma:contentTypeScope="" ma:versionID="642da1784587cbe85a7fdbbe4dc36103">
-  <xsd:schema xmlns:xsd="http://www.w3.org/2001/XMLSchema" xmlns:xs="http://www.w3.org/2001/XMLSchema" xmlns:p="http://schemas.microsoft.com/office/2006/metadata/properties" xmlns:ns1="http://schemas.microsoft.com/sharepoint/v3" xmlns:ns2="2023ac63-7b75-4916-a9ee-591457758eee" xmlns:ns3="d9c797ad-d7c3-4982-82b7-81352a75e4a5" targetNamespace="http://schemas.microsoft.com/office/2006/metadata/properties" ma:root="true" ma:fieldsID="91198b0246576053cc55dd2c67035a89" ns1:_="" ns2:_="" ns3:_="">
-    <xsd:import namespace="http://schemas.microsoft.com/sharepoint/v3"/>
-    <xsd:import namespace="2023ac63-7b75-4916-a9ee-591457758eee"/>
-    <xsd:import namespace="d9c797ad-d7c3-4982-82b7-81352a75e4a5"/>
-    <xsd:element name="properties">
-      <xsd:complexType>
-        <xsd:sequence>
-          <xsd:element name="documentManagement">
-            <xsd:complexType>
-              <xsd:all>
-                <xsd:element ref="ns2:SharedWithUsers" minOccurs="0"/>
-                <xsd:element ref="ns2:SharedWithDetails" minOccurs="0"/>
-                <xsd:element ref="ns2:LastSharedByUser" minOccurs="0"/>
-                <xsd:element ref="ns2:LastSharedByTime" minOccurs="0"/>
-                <xsd:element ref="ns3:MediaServiceMetadata" minOccurs="0"/>
-                <xsd:element ref="ns3:MediaServiceFastMetadata" minOccurs="0"/>
-                <xsd:element ref="ns1:_ip_UnifiedCompliancePolicyProperties" minOccurs="0"/>
-                <xsd:element ref="ns1:_ip_UnifiedCompliancePolicyUIAction" minOccurs="0"/>
-                <xsd:element ref="ns3:MediaServiceDateTaken" minOccurs="0"/>
-              </xsd:all>
-            </xsd:complexType>
-          </xsd:element>
-        </xsd:sequence>
-      </xsd:complexType>
-    </xsd:element>
-  </xsd:schema>
-  <xsd:schema xmlns:xsd="http://www.w3.org/2001/XMLSchema" xmlns:xs="http://www.w3.org/2001/XMLSchema" xmlns:dms="http://schemas.microsoft.com/office/2006/documentManagement/types" xmlns:pc="http://schemas.microsoft.com/office/infopath/2007/PartnerControls" targetNamespace="http://schemas.microsoft.com/sharepoint/v3" elementFormDefault="qualified">
-    <xsd:import namespace="http://schemas.microsoft.com/office/2006/documentManagement/types"/>
-    <xsd:import namespace="http://schemas.microsoft.com/office/infopath/2007/PartnerControls"/>
-    <xsd:element name="_ip_UnifiedCompliancePolicyProperties" ma:index="14" nillable="true" ma:displayName="Unified Compliance Policy Properties" ma:description="" ma:hidden="true" ma:internalName="_ip_UnifiedCompliancePolicyProperties">
-      <xsd:simpleType>
-        <xsd:restriction base="dms:Note"/>
-      </xsd:simpleType>
-    </xsd:element>
-    <xsd:element name="_ip_UnifiedCompliancePolicyUIAction" ma:index="15" nillable="true" ma:displayName="Unified Compliance Policy UI Action" ma:description="" ma:hidden="true" ma:internalName="_ip_UnifiedCompliancePolicyUIAction">
-      <xsd:simpleType>
-        <xsd:restriction base="dms:Text"/>
-      </xsd:simpleType>
-    </xsd:element>
-  </xsd:schema>
-  <xsd:schema xmlns:xsd="http://www.w3.org/2001/XMLSchema" xmlns:xs="http://www.w3.org/2001/XMLSchema" xmlns:dms="http://schemas.microsoft.com/office/2006/documentManagement/types" xmlns:pc="http://schemas.microsoft.com/office/infopath/2007/PartnerControls" targetNamespace="2023ac63-7b75-4916-a9ee-591457758eee" elementFormDefault="qualified">
-    <xsd:import namespace="http://schemas.microsoft.com/office/2006/documentManagement/types"/>
-    <xsd:import namespace="http://schemas.microsoft.com/office/infopath/2007/PartnerControls"/>
-    <xsd:element name="SharedWithUsers" ma:index="8" nillable="true" ma:displayName="Shared With" ma:description="" ma:internalName="SharedWithUsers" ma:readOnly="true">
-      <xsd:complexType>
-        <xsd:complexContent>
-          <xsd:extension base="dms:UserMulti">
-            <xsd:sequence>
-              <xsd:element name="UserInfo" minOccurs="0" maxOccurs="unbounded">
-                <xsd:complexType>
-                  <xsd:sequence>
-                    <xsd:element name="DisplayName" type="xsd:string" minOccurs="0"/>
-                    <xsd:element name="AccountId" type="dms:UserId" minOccurs="0" nillable="true"/>
-                    <xsd:element name="AccountType" type="xsd:string" minOccurs="0"/>
-                  </xsd:sequence>
-                </xsd:complexType>
-              </xsd:element>
-            </xsd:sequence>
-          </xsd:extension>
-        </xsd:complexContent>
-      </xsd:complexType>
-    </xsd:element>
-    <xsd:element name="SharedWithDetails" ma:index="9" nillable="true" ma:displayName="Shared With Details" ma:description="" ma:internalName="SharedWithDetails" ma:readOnly="true">
-      <xsd:simpleType>
-        <xsd:restriction base="dms:Note">
-          <xsd:maxLength value="255"/>
-        </xsd:restriction>
-      </xsd:simpleType>
-    </xsd:element>
-    <xsd:element name="LastSharedByUser" ma:index="10" nillable="true" ma:displayName="Last Shared By User" ma:description="" ma:internalName="LastSharedByUser" ma:readOnly="true">
-      <xsd:simpleType>
-        <xsd:restriction base="dms:Note">
-          <xsd:maxLength value="255"/>
-        </xsd:restriction>
-      </xsd:simpleType>
-    </xsd:element>
-    <xsd:element name="LastSharedByTime" ma:index="11" nillable="true" ma:displayName="Last Shared By Time" ma:description="" ma:internalName="LastSharedByTime" ma:readOnly="true">
-      <xsd:simpleType>
-        <xsd:restriction base="dms:DateTime"/>
-      </xsd:simpleType>
-    </xsd:element>
-  </xsd:schema>
-  <xsd:schema xmlns:xsd="http://www.w3.org/2001/XMLSchema" xmlns:xs="http://www.w3.org/2001/XMLSchema" xmlns:dms="http://schemas.microsoft.com/office/2006/documentManagement/types" xmlns:pc="http://schemas.microsoft.com/office/infopath/2007/PartnerControls" targetNamespace="d9c797ad-d7c3-4982-82b7-81352a75e4a5" elementFormDefault="qualified">
-    <xsd:import namespace="http://schemas.microsoft.com/office/2006/documentManagement/types"/>
-    <xsd:import namespace="http://schemas.microsoft.com/office/infopath/2007/PartnerControls"/>
-    <xsd:element name="MediaServiceMetadata" ma:index="12" nillable="true" ma:displayName="MediaServiceMetadata" ma:description="" ma:hidden="true" ma:internalName="MediaServiceMetadata" ma:readOnly="true">
-      <xsd:simpleType>
-        <xsd:restriction base="dms:Note"/>
-      </xsd:simpleType>
-    </xsd:element>
-    <xsd:element name="MediaServiceFastMetadata" ma:index="13" nillable="true" ma:displayName="MediaServiceFastMetadata" ma:description="" ma:hidden="true" ma:internalName="MediaServiceFastMetadata" ma:readOnly="true">
-      <xsd:simpleType>
-        <xsd:restriction base="dms:Note"/>
-      </xsd:simpleType>
-    </xsd:element>
-    <xsd:element name="MediaServiceDateTaken" ma:index="16" nillable="true" ma:displayName="MediaServiceDateTaken" ma:hidden="true" ma:internalName="MediaServiceDateTaken" ma:readOnly="true">
-      <xsd:simpleType>
-        <xsd:restriction base="dms:Text"/>
-      </xsd:simpleType>
-    </xsd:element>
-  </xsd:schema>
-  <xsd:schema xmlns="http://schemas.openxmlformats.org/package/2006/metadata/core-properties" xmlns:xsd="http://www.w3.org/2001/XMLSchema" xmlns:xsi="http://www.w3.org/2001/XMLSchema-instance" xmlns:dc="http://purl.org/dc/elements/1.1/" xmlns:dcterms="http://purl.org/dc/terms/" xmlns:odoc="http://schemas.microsoft.com/internal/obd" targetNamespace="http://schemas.openxmlformats.org/package/2006/metadata/core-properties" elementFormDefault="qualified" attributeFormDefault="unqualified" blockDefault="#all">
-    <xsd:import namespace="http://purl.org/dc/elements/1.1/" schemaLocation="http://dublincore.org/schemas/xmls/qdc/2003/04/02/dc.xsd"/>
-    <xsd:import namespace="http://purl.org/dc/terms/" schemaLocation="http://dublincore.org/schemas/xmls/qdc/2003/04/02/dcterms.xsd"/>
-    <xsd:element name="coreProperties" type="CT_coreProperties"/>
-    <xsd:complexType name="CT_coreProperties">
-      <xsd:all>
-        <xsd:element ref="dc:creator" minOccurs="0" maxOccurs="1"/>
-        <xsd:element ref="dcterms:created" minOccurs="0" maxOccurs="1"/>
-        <xsd:element ref="dc:identifier" minOccurs="0" maxOccurs="1"/>
-        <xsd:element name="contentType" minOccurs="0" maxOccurs="1" type="xsd:string" ma:index="0" ma:displayName="Content Type"/>
-        <xsd:element ref="dc:title" minOccurs="0" maxOccurs="1" ma:index="4" ma:displayName="Title"/>
-        <xsd:element ref="dc:subject" minOccurs="0" maxOccurs="1"/>
-        <xsd:element ref="dc:description" minOccurs="0" maxOccurs="1"/>
-        <xsd:element name="keywords" minOccurs="0" maxOccurs="1" type="xsd:string"/>
-        <xsd:element ref="dc:language" minOccurs="0" maxOccurs="1"/>
-        <xsd:element name="category" minOccurs="0" maxOccurs="1" type="xsd:string"/>
-        <xsd:element name="version" minOccurs="0" maxOccurs="1" type="xsd:string"/>
-        <xsd:element name="revision" minOccurs="0" maxOccurs="1" type="xsd:string">
-          <xsd:annotation>
-            <xsd:documentation>
-                        This value indicates the number of saves or revisions. The application is responsible for updating this value after each revision.
-                    </xsd:documentation>
-          </xsd:annotation>
-        </xsd:element>
-        <xsd:element name="lastModifiedBy" minOccurs="0" maxOccurs="1" type="xsd:string"/>
-        <xsd:element ref="dcterms:modified" minOccurs="0" maxOccurs="1"/>
-        <xsd:element name="contentStatus" minOccurs="0" maxOccurs="1" type="xsd:string"/>
-      </xsd:all>
-    </xsd:complexType>
-  </xsd:schema>
-  <xs:schema xmlns:pc="http://schemas.microsoft.com/office/infopath/2007/PartnerControls" xmlns:xs="http://www.w3.org/2001/XMLSchema" targetNamespace="http://schemas.microsoft.com/office/infopath/2007/PartnerControls" elementFormDefault="qualified" attributeFormDefault="unqualified">
-    <xs:element name="Person">
-      <xs:complexType>
-        <xs:sequence>
-          <xs:element ref="pc:DisplayName" minOccurs="0"/>
-          <xs:element ref="pc:AccountId" minOccurs="0"/>
-          <xs:element ref="pc:AccountType" minOccurs="0"/>
-        </xs:sequence>
-      </xs:complexType>
-    </xs:element>
-    <xs:element name="DisplayName" type="xs:string"/>
-    <xs:element name="AccountId" type="xs:string"/>
-    <xs:element name="AccountType" type="xs:string"/>
-    <xs:element name="BDCAssociatedEntity">
-      <xs:complexType>
-        <xs:sequence>
-          <xs:element ref="pc:BDCEntity" minOccurs="0" maxOccurs="unbounded"/>
-        </xs:sequence>
-        <xs:attribute ref="pc:EntityNamespace"/>
-        <xs:attribute ref="pc:EntityName"/>
-        <xs:attribute ref="pc:SystemInstanceName"/>
-        <xs:attribute ref="pc:AssociationName"/>
-      </xs:complexType>
-    </xs:element>
-    <xs:attribute name="EntityNamespace" type="xs:string"/>
-    <xs:attribute name="EntityName" type="xs:string"/>
-    <xs:attribute name="SystemInstanceName" type="xs:string"/>
-    <xs:attribute name="AssociationName" type="xs:string"/>
-    <xs:element name="BDCEntity">
-      <xs:complexType>
-        <xs:sequence>
-          <xs:element ref="pc:EntityDisplayName" minOccurs="0"/>
-          <xs:element ref="pc:EntityInstanceReference" minOccurs="0"/>
-          <xs:element ref="pc:EntityId1" minOccurs="0"/>
-          <xs:element ref="pc:EntityId2" minOccurs="0"/>
-          <xs:element ref="pc:EntityId3" minOccurs="0"/>
-          <xs:element ref="pc:EntityId4" minOccurs="0"/>
-          <xs:element ref="pc:EntityId5" minOccurs="0"/>
-        </xs:sequence>
-      </xs:complexType>
-    </xs:element>
-    <xs:element name="EntityDisplayName" type="xs:string"/>
-    <xs:element name="EntityInstanceReference" type="xs:string"/>
-    <xs:element name="EntityId1" type="xs:string"/>
-    <xs:element name="EntityId2" type="xs:string"/>
-    <xs:element name="EntityId3" type="xs:string"/>
-    <xs:element name="EntityId4" type="xs:string"/>
-    <xs:element name="EntityId5" type="xs:string"/>
-    <xs:element name="Terms">
-      <xs:complexType>
-        <xs:sequence>
-          <xs:element ref="pc:TermInfo" minOccurs="0" maxOccurs="unbounded"/>
-        </xs:sequence>
-      </xs:complexType>
-    </xs:element>
-    <xs:element name="TermInfo">
-      <xs:complexType>
-        <xs:sequence>
-          <xs:element ref="pc:TermName" minOccurs="0"/>
-          <xs:element ref="pc:TermId" minOccurs="0"/>
-        </xs:sequence>
-      </xs:complexType>
-    </xs:element>
-    <xs:element name="TermName" type="xs:string"/>
-    <xs:element name="TermId" type="xs:string"/>
-  </xs:schema>
-</ct:contentTypeSchema>
-</file>
-
-<file path=customXml/itemProps1.xml><?xml version="1.0" encoding="utf-8"?>
-<ds:datastoreItem xmlns:ds="http://schemas.openxmlformats.org/officeDocument/2006/customXml" ds:itemID="{BAF7D529-36AB-45DA-B239-2F912F2D1610}">
-  <ds:schemaRefs>
-    <ds:schemaRef ds:uri="http://purl.org/dc/dcmitype/"/>
-    <ds:schemaRef ds:uri="http://schemas.microsoft.com/office/2006/metadata/properties"/>
-    <ds:schemaRef ds:uri="http://purl.org/dc/elements/1.1/"/>
-    <ds:schemaRef ds:uri="http://schemas.microsoft.com/sharepoint/v3"/>
-    <ds:schemaRef ds:uri="http://schemas.openxmlformats.org/package/2006/metadata/core-properties"/>
-    <ds:schemaRef ds:uri="http://purl.org/dc/terms/"/>
-    <ds:schemaRef ds:uri="http://schemas.microsoft.com/office/infopath/2007/PartnerControls"/>
-    <ds:schemaRef ds:uri="http://schemas.microsoft.com/office/2006/documentManagement/types"/>
-    <ds:schemaRef ds:uri="d9c797ad-d7c3-4982-82b7-81352a75e4a5"/>
-    <ds:schemaRef ds:uri="2023ac63-7b75-4916-a9ee-591457758eee"/>
-    <ds:schemaRef ds:uri="http://www.w3.org/XML/1998/namespace"/>
-  </ds:schemaRefs>
-</ds:datastoreItem>
-</file>
-
-<file path=customXml/itemProps2.xml><?xml version="1.0" encoding="utf-8"?>
-<ds:datastoreItem xmlns:ds="http://schemas.openxmlformats.org/officeDocument/2006/customXml" ds:itemID="{F18501AF-04CF-4482-BAE1-607B49DDC378}">
-  <ds:schemaRefs>
-    <ds:schemaRef ds:uri="http://schemas.microsoft.com/sharepoint/v3/contenttype/forms"/>
-  </ds:schemaRefs>
-</ds:datastoreItem>
-</file>
-
-<file path=customXml/itemProps3.xml><?xml version="1.0" encoding="utf-8"?>
-<ds:datastoreItem xmlns:ds="http://schemas.openxmlformats.org/officeDocument/2006/customXml" ds:itemID="{255F5BEB-6AD6-480A-8556-C80C5EBC10F2}">
-  <ds:schemaRefs>
-    <ds:schemaRef ds:uri="http://schemas.microsoft.com/office/2006/metadata/contentType"/>
-    <ds:schemaRef ds:uri="http://schemas.microsoft.com/office/2006/metadata/properties/metaAttributes"/>
-    <ds:schemaRef ds:uri="http://www.w3.org/2001/XMLSchema"/>
-    <ds:schemaRef ds:uri="http://schemas.microsoft.com/office/2006/metadata/properties"/>
-    <ds:schemaRef ds:uri="http://schemas.microsoft.com/sharepoint/v3"/>
-    <ds:schemaRef ds:uri="2023ac63-7b75-4916-a9ee-591457758eee"/>
-    <ds:schemaRef ds:uri="d9c797ad-d7c3-4982-82b7-81352a75e4a5"/>
-    <ds:schemaRef ds:uri="http://schemas.microsoft.com/office/2006/documentManagement/types"/>
-    <ds:schemaRef ds:uri="http://schemas.microsoft.com/office/infopath/2007/PartnerControls"/>
-    <ds:schemaRef ds:uri="http://schemas.openxmlformats.org/package/2006/metadata/core-properties"/>
-    <ds:schemaRef ds:uri="http://purl.org/dc/elements/1.1/"/>
-    <ds:schemaRef ds:uri="http://purl.org/dc/terms/"/>
-    <ds:schemaRef ds:uri="http://schemas.microsoft.com/internal/obd"/>
-  </ds:schemaRefs>
-</ds:datastoreItem>
 </file>
</xml_diff>